<commit_message>
Added unbounded total concurrent queues.
</commit_message>
<xml_diff>
--- a/Pools.pptx
+++ b/Pools.pptx
@@ -107,6 +107,11 @@
       </a:defRPr>
     </a:lvl9pPr>
   </p:defaultTextStyle>
+  <p:extLst>
+    <p:ext uri="{EFAFB233-063F-42B5-8137-9DF3F51BA10A}">
+      <p15:sldGuideLst xmlns:p15="http://schemas.microsoft.com/office/powerpoint/2012/main"/>
+    </p:ext>
+  </p:extLst>
 </p:presentation>
 </file>
 
@@ -4255,14 +4260,6 @@
           </a:p>
           <a:p>
             <a:pPr lvl="1"/>
-            <a:r>
-              <a:rPr lang="es-ES_tradnl" dirty="0" err="1" smtClean="0"/>
-              <a:t>LinkedList</a:t>
-            </a:r>
-            <a:endParaRPr lang="es-ES_tradnl" dirty="0" smtClean="0"/>
-          </a:p>
-          <a:p>
-            <a:pPr lvl="1"/>
             <a:endParaRPr lang="es-ES_tradnl" dirty="0"/>
           </a:p>
           <a:p>

</xml_diff>